<commit_message>
Add guide for masternode owners and developers and refine layout
</commit_message>
<xml_diff>
--- a/docs/assets/overview.pptx
+++ b/docs/assets/overview.pptx
@@ -3323,50 +3323,862 @@
       </p:grpSpPr>
       <p:sp>
         <p:nvSpPr>
-          <p:cNvPr id="2" name="Title 1">
-            <a:extLst>
-              <a:ext uri="{FF2B5EF4-FFF2-40B4-BE49-F238E27FC236}">
-                <a16:creationId xmlns:a16="http://schemas.microsoft.com/office/drawing/2014/main" id="{3BF73670-114A-7B4E-91D6-5C13B043AE36}"/>
-              </a:ext>
-            </a:extLst>
-          </p:cNvPr>
-          <p:cNvSpPr>
-            <a:spLocks noGrp="1"/>
-          </p:cNvSpPr>
-          <p:nvPr>
-            <p:ph type="ctrTitle"/>
-          </p:nvPr>
-        </p:nvSpPr>
-        <p:spPr/>
-        <p:txBody>
-          <a:bodyPr/>
-          <a:lstStyle/>
-          <a:p>
+          <p:cNvPr id="4" name="Rounded Rectangle 3">
+            <a:extLst>
+              <a:ext uri="{FF2B5EF4-FFF2-40B4-BE49-F238E27FC236}">
+                <a16:creationId xmlns:a16="http://schemas.microsoft.com/office/drawing/2014/main" id="{2C219035-C001-4F4F-B1E2-88CC46D49B5F}"/>
+              </a:ext>
+            </a:extLst>
+          </p:cNvPr>
+          <p:cNvSpPr/>
+          <p:nvPr/>
+        </p:nvSpPr>
+        <p:spPr>
+          <a:xfrm>
+            <a:off x="3669175" y="3391382"/>
+            <a:ext cx="613458" cy="567160"/>
+          </a:xfrm>
+          <a:prstGeom prst="roundRect">
+            <a:avLst/>
+          </a:prstGeom>
+          <a:solidFill>
+            <a:schemeClr val="accent6">
+              <a:lumMod val="40000"/>
+              <a:lumOff val="60000"/>
+            </a:schemeClr>
+          </a:solidFill>
+        </p:spPr>
+        <p:style>
+          <a:lnRef idx="2">
+            <a:schemeClr val="accent1">
+              <a:shade val="50000"/>
+            </a:schemeClr>
+          </a:lnRef>
+          <a:fillRef idx="1">
+            <a:schemeClr val="accent1"/>
+          </a:fillRef>
+          <a:effectRef idx="0">
+            <a:schemeClr val="accent1"/>
+          </a:effectRef>
+          <a:fontRef idx="minor">
+            <a:schemeClr val="lt1"/>
+          </a:fontRef>
+        </p:style>
+        <p:txBody>
+          <a:bodyPr rtlCol="0" anchor="ctr"/>
+          <a:lstStyle/>
+          <a:p>
+            <a:pPr algn="ctr"/>
             <a:endParaRPr lang="en-US"/>
           </a:p>
         </p:txBody>
       </p:sp>
       <p:sp>
         <p:nvSpPr>
-          <p:cNvPr id="3" name="Subtitle 2">
-            <a:extLst>
-              <a:ext uri="{FF2B5EF4-FFF2-40B4-BE49-F238E27FC236}">
-                <a16:creationId xmlns:a16="http://schemas.microsoft.com/office/drawing/2014/main" id="{A2B46A37-03F2-4F46-82BA-4E10BB780DDB}"/>
-              </a:ext>
-            </a:extLst>
-          </p:cNvPr>
-          <p:cNvSpPr>
-            <a:spLocks noGrp="1"/>
-          </p:cNvSpPr>
-          <p:nvPr>
-            <p:ph type="subTitle" idx="1"/>
-          </p:nvPr>
-        </p:nvSpPr>
-        <p:spPr/>
-        <p:txBody>
-          <a:bodyPr/>
-          <a:lstStyle/>
-          <a:p>
+          <p:cNvPr id="5" name="Rounded Rectangle 4">
+            <a:extLst>
+              <a:ext uri="{FF2B5EF4-FFF2-40B4-BE49-F238E27FC236}">
+                <a16:creationId xmlns:a16="http://schemas.microsoft.com/office/drawing/2014/main" id="{8A0118C8-D073-614E-A945-A9CE4B80C21F}"/>
+              </a:ext>
+            </a:extLst>
+          </p:cNvPr>
+          <p:cNvSpPr/>
+          <p:nvPr/>
+        </p:nvSpPr>
+        <p:spPr>
+          <a:xfrm>
+            <a:off x="4747549" y="3391382"/>
+            <a:ext cx="613458" cy="567160"/>
+          </a:xfrm>
+          <a:prstGeom prst="roundRect">
+            <a:avLst/>
+          </a:prstGeom>
+          <a:solidFill>
+            <a:schemeClr val="accent6">
+              <a:lumMod val="40000"/>
+              <a:lumOff val="60000"/>
+            </a:schemeClr>
+          </a:solidFill>
+        </p:spPr>
+        <p:style>
+          <a:lnRef idx="2">
+            <a:schemeClr val="accent1">
+              <a:shade val="50000"/>
+            </a:schemeClr>
+          </a:lnRef>
+          <a:fillRef idx="1">
+            <a:schemeClr val="accent1"/>
+          </a:fillRef>
+          <a:effectRef idx="0">
+            <a:schemeClr val="accent1"/>
+          </a:effectRef>
+          <a:fontRef idx="minor">
+            <a:schemeClr val="lt1"/>
+          </a:fontRef>
+        </p:style>
+        <p:txBody>
+          <a:bodyPr rtlCol="0" anchor="ctr"/>
+          <a:lstStyle/>
+          <a:p>
+            <a:pPr algn="ctr"/>
+            <a:endParaRPr lang="en-US"/>
+          </a:p>
+        </p:txBody>
+      </p:sp>
+      <p:cxnSp>
+        <p:nvCxnSpPr>
+          <p:cNvPr id="7" name="Straight Arrow Connector 6">
+            <a:extLst>
+              <a:ext uri="{FF2B5EF4-FFF2-40B4-BE49-F238E27FC236}">
+                <a16:creationId xmlns:a16="http://schemas.microsoft.com/office/drawing/2014/main" id="{2B7542B7-DDE5-7B4B-94A5-869BC84212D8}"/>
+              </a:ext>
+            </a:extLst>
+          </p:cNvPr>
+          <p:cNvCxnSpPr>
+            <a:stCxn id="5" idx="1"/>
+            <a:endCxn id="4" idx="3"/>
+          </p:cNvCxnSpPr>
+          <p:nvPr/>
+        </p:nvCxnSpPr>
+        <p:spPr>
+          <a:xfrm flipH="1">
+            <a:off x="4282633" y="3674962"/>
+            <a:ext cx="464916" cy="0"/>
+          </a:xfrm>
+          <a:prstGeom prst="straightConnector1">
+            <a:avLst/>
+          </a:prstGeom>
+          <a:ln>
+            <a:tailEnd type="triangle"/>
+          </a:ln>
+        </p:spPr>
+        <p:style>
+          <a:lnRef idx="1">
+            <a:schemeClr val="accent1"/>
+          </a:lnRef>
+          <a:fillRef idx="0">
+            <a:schemeClr val="accent1"/>
+          </a:fillRef>
+          <a:effectRef idx="0">
+            <a:schemeClr val="accent1"/>
+          </a:effectRef>
+          <a:fontRef idx="minor">
+            <a:schemeClr val="tx1"/>
+          </a:fontRef>
+        </p:style>
+      </p:cxnSp>
+      <p:sp>
+        <p:nvSpPr>
+          <p:cNvPr id="8" name="Rounded Rectangle 7">
+            <a:extLst>
+              <a:ext uri="{FF2B5EF4-FFF2-40B4-BE49-F238E27FC236}">
+                <a16:creationId xmlns:a16="http://schemas.microsoft.com/office/drawing/2014/main" id="{A71A12C3-14E2-104E-9581-DD5E8D52B4D8}"/>
+              </a:ext>
+            </a:extLst>
+          </p:cNvPr>
+          <p:cNvSpPr/>
+          <p:nvPr/>
+        </p:nvSpPr>
+        <p:spPr>
+          <a:xfrm>
+            <a:off x="5840211" y="3391382"/>
+            <a:ext cx="613458" cy="567160"/>
+          </a:xfrm>
+          <a:prstGeom prst="roundRect">
+            <a:avLst/>
+          </a:prstGeom>
+          <a:solidFill>
+            <a:schemeClr val="accent6">
+              <a:lumMod val="40000"/>
+              <a:lumOff val="60000"/>
+            </a:schemeClr>
+          </a:solidFill>
+        </p:spPr>
+        <p:style>
+          <a:lnRef idx="2">
+            <a:schemeClr val="accent1">
+              <a:shade val="50000"/>
+            </a:schemeClr>
+          </a:lnRef>
+          <a:fillRef idx="1">
+            <a:schemeClr val="accent1"/>
+          </a:fillRef>
+          <a:effectRef idx="0">
+            <a:schemeClr val="accent1"/>
+          </a:effectRef>
+          <a:fontRef idx="minor">
+            <a:schemeClr val="lt1"/>
+          </a:fontRef>
+        </p:style>
+        <p:txBody>
+          <a:bodyPr rtlCol="0" anchor="ctr"/>
+          <a:lstStyle/>
+          <a:p>
+            <a:pPr algn="ctr"/>
+            <a:endParaRPr lang="en-US"/>
+          </a:p>
+        </p:txBody>
+      </p:sp>
+      <p:cxnSp>
+        <p:nvCxnSpPr>
+          <p:cNvPr id="9" name="Straight Arrow Connector 8">
+            <a:extLst>
+              <a:ext uri="{FF2B5EF4-FFF2-40B4-BE49-F238E27FC236}">
+                <a16:creationId xmlns:a16="http://schemas.microsoft.com/office/drawing/2014/main" id="{FB039070-1FB4-684E-B2AA-E7BC43F25362}"/>
+              </a:ext>
+            </a:extLst>
+          </p:cNvPr>
+          <p:cNvCxnSpPr>
+            <a:cxnSpLocks/>
+            <a:stCxn id="8" idx="1"/>
+            <a:endCxn id="5" idx="3"/>
+          </p:cNvCxnSpPr>
+          <p:nvPr/>
+        </p:nvCxnSpPr>
+        <p:spPr>
+          <a:xfrm flipH="1">
+            <a:off x="5361007" y="3674962"/>
+            <a:ext cx="479204" cy="0"/>
+          </a:xfrm>
+          <a:prstGeom prst="straightConnector1">
+            <a:avLst/>
+          </a:prstGeom>
+          <a:ln>
+            <a:tailEnd type="triangle"/>
+          </a:ln>
+        </p:spPr>
+        <p:style>
+          <a:lnRef idx="1">
+            <a:schemeClr val="accent1"/>
+          </a:lnRef>
+          <a:fillRef idx="0">
+            <a:schemeClr val="accent1"/>
+          </a:fillRef>
+          <a:effectRef idx="0">
+            <a:schemeClr val="accent1"/>
+          </a:effectRef>
+          <a:fontRef idx="minor">
+            <a:schemeClr val="tx1"/>
+          </a:fontRef>
+        </p:style>
+      </p:cxnSp>
+      <p:sp>
+        <p:nvSpPr>
+          <p:cNvPr id="11" name="Rounded Rectangle 10">
+            <a:extLst>
+              <a:ext uri="{FF2B5EF4-FFF2-40B4-BE49-F238E27FC236}">
+                <a16:creationId xmlns:a16="http://schemas.microsoft.com/office/drawing/2014/main" id="{08C8DA81-5629-394F-998E-D2E7AAF03E58}"/>
+              </a:ext>
+            </a:extLst>
+          </p:cNvPr>
+          <p:cNvSpPr/>
+          <p:nvPr/>
+        </p:nvSpPr>
+        <p:spPr>
+          <a:xfrm>
+            <a:off x="6932873" y="3391382"/>
+            <a:ext cx="613458" cy="567160"/>
+          </a:xfrm>
+          <a:prstGeom prst="roundRect">
+            <a:avLst/>
+          </a:prstGeom>
+          <a:solidFill>
+            <a:schemeClr val="accent6">
+              <a:lumMod val="40000"/>
+              <a:lumOff val="60000"/>
+            </a:schemeClr>
+          </a:solidFill>
+        </p:spPr>
+        <p:style>
+          <a:lnRef idx="2">
+            <a:schemeClr val="accent1">
+              <a:shade val="50000"/>
+            </a:schemeClr>
+          </a:lnRef>
+          <a:fillRef idx="1">
+            <a:schemeClr val="accent1"/>
+          </a:fillRef>
+          <a:effectRef idx="0">
+            <a:schemeClr val="accent1"/>
+          </a:effectRef>
+          <a:fontRef idx="minor">
+            <a:schemeClr val="lt1"/>
+          </a:fontRef>
+        </p:style>
+        <p:txBody>
+          <a:bodyPr rtlCol="0" anchor="ctr"/>
+          <a:lstStyle/>
+          <a:p>
+            <a:pPr algn="ctr"/>
+            <a:endParaRPr lang="en-US"/>
+          </a:p>
+        </p:txBody>
+      </p:sp>
+      <p:cxnSp>
+        <p:nvCxnSpPr>
+          <p:cNvPr id="12" name="Straight Arrow Connector 11">
+            <a:extLst>
+              <a:ext uri="{FF2B5EF4-FFF2-40B4-BE49-F238E27FC236}">
+                <a16:creationId xmlns:a16="http://schemas.microsoft.com/office/drawing/2014/main" id="{60B74FF3-523F-BA49-BF61-5AE3D3E2641F}"/>
+              </a:ext>
+            </a:extLst>
+          </p:cNvPr>
+          <p:cNvCxnSpPr>
+            <a:cxnSpLocks/>
+            <a:stCxn id="11" idx="1"/>
+          </p:cNvCxnSpPr>
+          <p:nvPr/>
+        </p:nvCxnSpPr>
+        <p:spPr>
+          <a:xfrm flipH="1">
+            <a:off x="6453669" y="3674962"/>
+            <a:ext cx="479204" cy="0"/>
+          </a:xfrm>
+          <a:prstGeom prst="straightConnector1">
+            <a:avLst/>
+          </a:prstGeom>
+          <a:ln>
+            <a:tailEnd type="triangle"/>
+          </a:ln>
+        </p:spPr>
+        <p:style>
+          <a:lnRef idx="1">
+            <a:schemeClr val="accent1"/>
+          </a:lnRef>
+          <a:fillRef idx="0">
+            <a:schemeClr val="accent1"/>
+          </a:fillRef>
+          <a:effectRef idx="0">
+            <a:schemeClr val="accent1"/>
+          </a:effectRef>
+          <a:fontRef idx="minor">
+            <a:schemeClr val="tx1"/>
+          </a:fontRef>
+        </p:style>
+      </p:cxnSp>
+      <p:cxnSp>
+        <p:nvCxnSpPr>
+          <p:cNvPr id="13" name="Straight Arrow Connector 12">
+            <a:extLst>
+              <a:ext uri="{FF2B5EF4-FFF2-40B4-BE49-F238E27FC236}">
+                <a16:creationId xmlns:a16="http://schemas.microsoft.com/office/drawing/2014/main" id="{005513F7-E407-AF4D-BA22-CD2C7C70FB58}"/>
+              </a:ext>
+            </a:extLst>
+          </p:cNvPr>
+          <p:cNvCxnSpPr>
+            <a:cxnSpLocks/>
+          </p:cNvCxnSpPr>
+          <p:nvPr/>
+        </p:nvCxnSpPr>
+        <p:spPr>
+          <a:xfrm flipH="1">
+            <a:off x="3189971" y="3687561"/>
+            <a:ext cx="479204" cy="0"/>
+          </a:xfrm>
+          <a:prstGeom prst="straightConnector1">
+            <a:avLst/>
+          </a:prstGeom>
+          <a:ln>
+            <a:tailEnd type="triangle"/>
+          </a:ln>
+        </p:spPr>
+        <p:style>
+          <a:lnRef idx="1">
+            <a:schemeClr val="accent1"/>
+          </a:lnRef>
+          <a:fillRef idx="0">
+            <a:schemeClr val="accent1"/>
+          </a:fillRef>
+          <a:effectRef idx="0">
+            <a:schemeClr val="accent1"/>
+          </a:effectRef>
+          <a:fontRef idx="minor">
+            <a:schemeClr val="tx1"/>
+          </a:fontRef>
+        </p:style>
+      </p:cxnSp>
+      <p:sp>
+        <p:nvSpPr>
+          <p:cNvPr id="14" name="Rectangle 13">
+            <a:extLst>
+              <a:ext uri="{FF2B5EF4-FFF2-40B4-BE49-F238E27FC236}">
+                <a16:creationId xmlns:a16="http://schemas.microsoft.com/office/drawing/2014/main" id="{C6A1935F-6BAC-2F48-B19B-F0AF21A23CE4}"/>
+              </a:ext>
+            </a:extLst>
+          </p:cNvPr>
+          <p:cNvSpPr/>
+          <p:nvPr/>
+        </p:nvSpPr>
+        <p:spPr>
+          <a:xfrm>
+            <a:off x="2143116" y="3143252"/>
+            <a:ext cx="6486525" cy="1285876"/>
+          </a:xfrm>
+          <a:prstGeom prst="rect">
+            <a:avLst/>
+          </a:prstGeom>
+          <a:noFill/>
+        </p:spPr>
+        <p:style>
+          <a:lnRef idx="2">
+            <a:schemeClr val="accent1">
+              <a:shade val="50000"/>
+            </a:schemeClr>
+          </a:lnRef>
+          <a:fillRef idx="1">
+            <a:schemeClr val="accent1"/>
+          </a:fillRef>
+          <a:effectRef idx="0">
+            <a:schemeClr val="accent1"/>
+          </a:effectRef>
+          <a:fontRef idx="minor">
+            <a:schemeClr val="lt1"/>
+          </a:fontRef>
+        </p:style>
+        <p:txBody>
+          <a:bodyPr rtlCol="0" anchor="ctr"/>
+          <a:lstStyle/>
+          <a:p>
+            <a:pPr algn="ctr"/>
+            <a:endParaRPr lang="en-US" dirty="0">
+              <a:solidFill>
+                <a:schemeClr val="tx1"/>
+              </a:solidFill>
+            </a:endParaRPr>
+          </a:p>
+          <a:p>
+            <a:pPr algn="ctr"/>
+            <a:endParaRPr lang="en-US" dirty="0">
+              <a:solidFill>
+                <a:schemeClr val="tx1"/>
+              </a:solidFill>
+            </a:endParaRPr>
+          </a:p>
+          <a:p>
+            <a:pPr algn="ctr"/>
+            <a:endParaRPr lang="en-US" dirty="0">
+              <a:solidFill>
+                <a:schemeClr val="tx1"/>
+              </a:solidFill>
+            </a:endParaRPr>
+          </a:p>
+          <a:p>
+            <a:pPr algn="ctr"/>
+            <a:r>
+              <a:rPr lang="en-US" dirty="0">
+                <a:solidFill>
+                  <a:schemeClr val="tx1"/>
+                </a:solidFill>
+              </a:rPr>
+              <a:t>TomoChain blockchain</a:t>
+            </a:r>
+          </a:p>
+        </p:txBody>
+      </p:sp>
+      <p:sp>
+        <p:nvSpPr>
+          <p:cNvPr id="16" name="Rectangle 15">
+            <a:extLst>
+              <a:ext uri="{FF2B5EF4-FFF2-40B4-BE49-F238E27FC236}">
+                <a16:creationId xmlns:a16="http://schemas.microsoft.com/office/drawing/2014/main" id="{B9949546-4D93-F04E-B1AB-9AFD83FABE43}"/>
+              </a:ext>
+            </a:extLst>
+          </p:cNvPr>
+          <p:cNvSpPr/>
+          <p:nvPr/>
+        </p:nvSpPr>
+        <p:spPr>
+          <a:xfrm>
+            <a:off x="2214561" y="1800229"/>
+            <a:ext cx="1385887" cy="614369"/>
+          </a:xfrm>
+          <a:prstGeom prst="rect">
+            <a:avLst/>
+          </a:prstGeom>
+          <a:solidFill>
+            <a:schemeClr val="bg1"/>
+          </a:solidFill>
+        </p:spPr>
+        <p:style>
+          <a:lnRef idx="2">
+            <a:schemeClr val="accent1">
+              <a:shade val="50000"/>
+            </a:schemeClr>
+          </a:lnRef>
+          <a:fillRef idx="1">
+            <a:schemeClr val="accent1"/>
+          </a:fillRef>
+          <a:effectRef idx="0">
+            <a:schemeClr val="accent1"/>
+          </a:effectRef>
+          <a:fontRef idx="minor">
+            <a:schemeClr val="lt1"/>
+          </a:fontRef>
+        </p:style>
+        <p:txBody>
+          <a:bodyPr rtlCol="0" anchor="ctr"/>
+          <a:lstStyle/>
+          <a:p>
+            <a:pPr algn="ctr"/>
+            <a:r>
+              <a:rPr lang="en-US" dirty="0">
+                <a:solidFill>
+                  <a:schemeClr val="tx1"/>
+                </a:solidFill>
+              </a:rPr>
+              <a:t>TomoScan</a:t>
+            </a:r>
+          </a:p>
+        </p:txBody>
+      </p:sp>
+      <p:sp>
+        <p:nvSpPr>
+          <p:cNvPr id="17" name="Rectangle 16">
+            <a:extLst>
+              <a:ext uri="{FF2B5EF4-FFF2-40B4-BE49-F238E27FC236}">
+                <a16:creationId xmlns:a16="http://schemas.microsoft.com/office/drawing/2014/main" id="{5D8C8800-5DA8-2748-87DA-7C70BB500DFE}"/>
+              </a:ext>
+            </a:extLst>
+          </p:cNvPr>
+          <p:cNvSpPr/>
+          <p:nvPr/>
+        </p:nvSpPr>
+        <p:spPr>
+          <a:xfrm>
+            <a:off x="5596984" y="1800229"/>
+            <a:ext cx="1385887" cy="614369"/>
+          </a:xfrm>
+          <a:prstGeom prst="rect">
+            <a:avLst/>
+          </a:prstGeom>
+          <a:solidFill>
+            <a:schemeClr val="bg1"/>
+          </a:solidFill>
+        </p:spPr>
+        <p:style>
+          <a:lnRef idx="2">
+            <a:schemeClr val="accent1">
+              <a:shade val="50000"/>
+            </a:schemeClr>
+          </a:lnRef>
+          <a:fillRef idx="1">
+            <a:schemeClr val="accent1"/>
+          </a:fillRef>
+          <a:effectRef idx="0">
+            <a:schemeClr val="accent1"/>
+          </a:effectRef>
+          <a:fontRef idx="minor">
+            <a:schemeClr val="lt1"/>
+          </a:fontRef>
+        </p:style>
+        <p:txBody>
+          <a:bodyPr rtlCol="0" anchor="ctr"/>
+          <a:lstStyle/>
+          <a:p>
+            <a:pPr algn="ctr"/>
+            <a:r>
+              <a:rPr lang="en-US" dirty="0">
+                <a:solidFill>
+                  <a:schemeClr val="tx1"/>
+                </a:solidFill>
+              </a:rPr>
+              <a:t>TomoMaster</a:t>
+            </a:r>
+          </a:p>
+        </p:txBody>
+      </p:sp>
+      <p:sp>
+        <p:nvSpPr>
+          <p:cNvPr id="18" name="Rectangle 17">
+            <a:extLst>
+              <a:ext uri="{FF2B5EF4-FFF2-40B4-BE49-F238E27FC236}">
+                <a16:creationId xmlns:a16="http://schemas.microsoft.com/office/drawing/2014/main" id="{E9B00664-0A3F-CA4E-9196-CD3F8F9E9C02}"/>
+              </a:ext>
+            </a:extLst>
+          </p:cNvPr>
+          <p:cNvSpPr/>
+          <p:nvPr/>
+        </p:nvSpPr>
+        <p:spPr>
+          <a:xfrm>
+            <a:off x="3914772" y="1800219"/>
+            <a:ext cx="1385887" cy="614369"/>
+          </a:xfrm>
+          <a:prstGeom prst="rect">
+            <a:avLst/>
+          </a:prstGeom>
+          <a:solidFill>
+            <a:schemeClr val="bg1"/>
+          </a:solidFill>
+        </p:spPr>
+        <p:style>
+          <a:lnRef idx="2">
+            <a:schemeClr val="accent1">
+              <a:shade val="50000"/>
+            </a:schemeClr>
+          </a:lnRef>
+          <a:fillRef idx="1">
+            <a:schemeClr val="accent1"/>
+          </a:fillRef>
+          <a:effectRef idx="0">
+            <a:schemeClr val="accent1"/>
+          </a:effectRef>
+          <a:fontRef idx="minor">
+            <a:schemeClr val="lt1"/>
+          </a:fontRef>
+        </p:style>
+        <p:txBody>
+          <a:bodyPr rtlCol="0" anchor="ctr"/>
+          <a:lstStyle/>
+          <a:p>
+            <a:pPr algn="ctr"/>
+            <a:r>
+              <a:rPr lang="en-US" dirty="0">
+                <a:solidFill>
+                  <a:schemeClr val="tx1"/>
+                </a:solidFill>
+              </a:rPr>
+              <a:t>TomoX</a:t>
+            </a:r>
+          </a:p>
+        </p:txBody>
+      </p:sp>
+      <p:sp>
+        <p:nvSpPr>
+          <p:cNvPr id="19" name="Rectangle 18">
+            <a:extLst>
+              <a:ext uri="{FF2B5EF4-FFF2-40B4-BE49-F238E27FC236}">
+                <a16:creationId xmlns:a16="http://schemas.microsoft.com/office/drawing/2014/main" id="{8F6AE4ED-3579-BC41-BC2C-12B3EDE3973E}"/>
+              </a:ext>
+            </a:extLst>
+          </p:cNvPr>
+          <p:cNvSpPr/>
+          <p:nvPr/>
+        </p:nvSpPr>
+        <p:spPr>
+          <a:xfrm>
+            <a:off x="7236337" y="1800219"/>
+            <a:ext cx="1385887" cy="614369"/>
+          </a:xfrm>
+          <a:prstGeom prst="rect">
+            <a:avLst/>
+          </a:prstGeom>
+          <a:solidFill>
+            <a:schemeClr val="bg1"/>
+          </a:solidFill>
+        </p:spPr>
+        <p:style>
+          <a:lnRef idx="2">
+            <a:schemeClr val="accent1">
+              <a:shade val="50000"/>
+            </a:schemeClr>
+          </a:lnRef>
+          <a:fillRef idx="1">
+            <a:schemeClr val="accent1"/>
+          </a:fillRef>
+          <a:effectRef idx="0">
+            <a:schemeClr val="accent1"/>
+          </a:effectRef>
+          <a:fontRef idx="minor">
+            <a:schemeClr val="lt1"/>
+          </a:fontRef>
+        </p:style>
+        <p:txBody>
+          <a:bodyPr rtlCol="0" anchor="ctr"/>
+          <a:lstStyle/>
+          <a:p>
+            <a:pPr algn="ctr"/>
+            <a:r>
+              <a:rPr lang="en-US" dirty="0">
+                <a:solidFill>
+                  <a:schemeClr val="tx1"/>
+                </a:solidFill>
+              </a:rPr>
+              <a:t>TomoWallet</a:t>
+            </a:r>
+          </a:p>
+        </p:txBody>
+      </p:sp>
+      <p:sp>
+        <p:nvSpPr>
+          <p:cNvPr id="20" name="Up-Down Arrow 19">
+            <a:extLst>
+              <a:ext uri="{FF2B5EF4-FFF2-40B4-BE49-F238E27FC236}">
+                <a16:creationId xmlns:a16="http://schemas.microsoft.com/office/drawing/2014/main" id="{36DF4D08-4071-C54C-BA3F-68717009A549}"/>
+              </a:ext>
+            </a:extLst>
+          </p:cNvPr>
+          <p:cNvSpPr/>
+          <p:nvPr/>
+        </p:nvSpPr>
+        <p:spPr>
+          <a:xfrm>
+            <a:off x="2828924" y="2414588"/>
+            <a:ext cx="185738" cy="728664"/>
+          </a:xfrm>
+          <a:prstGeom prst="upDownArrow">
+            <a:avLst/>
+          </a:prstGeom>
+        </p:spPr>
+        <p:style>
+          <a:lnRef idx="2">
+            <a:schemeClr val="accent1">
+              <a:shade val="50000"/>
+            </a:schemeClr>
+          </a:lnRef>
+          <a:fillRef idx="1">
+            <a:schemeClr val="accent1"/>
+          </a:fillRef>
+          <a:effectRef idx="0">
+            <a:schemeClr val="accent1"/>
+          </a:effectRef>
+          <a:fontRef idx="minor">
+            <a:schemeClr val="lt1"/>
+          </a:fontRef>
+        </p:style>
+        <p:txBody>
+          <a:bodyPr rtlCol="0" anchor="ctr"/>
+          <a:lstStyle/>
+          <a:p>
+            <a:pPr algn="ctr"/>
+            <a:endParaRPr lang="en-US"/>
+          </a:p>
+        </p:txBody>
+      </p:sp>
+      <p:sp>
+        <p:nvSpPr>
+          <p:cNvPr id="21" name="Up-Down Arrow 20">
+            <a:extLst>
+              <a:ext uri="{FF2B5EF4-FFF2-40B4-BE49-F238E27FC236}">
+                <a16:creationId xmlns:a16="http://schemas.microsoft.com/office/drawing/2014/main" id="{BF2229B6-CFF3-2D48-9147-6E75DB4D8B16}"/>
+              </a:ext>
+            </a:extLst>
+          </p:cNvPr>
+          <p:cNvSpPr/>
+          <p:nvPr/>
+        </p:nvSpPr>
+        <p:spPr>
+          <a:xfrm>
+            <a:off x="4536276" y="2411608"/>
+            <a:ext cx="185738" cy="728664"/>
+          </a:xfrm>
+          <a:prstGeom prst="upDownArrow">
+            <a:avLst/>
+          </a:prstGeom>
+        </p:spPr>
+        <p:style>
+          <a:lnRef idx="2">
+            <a:schemeClr val="accent1">
+              <a:shade val="50000"/>
+            </a:schemeClr>
+          </a:lnRef>
+          <a:fillRef idx="1">
+            <a:schemeClr val="accent1"/>
+          </a:fillRef>
+          <a:effectRef idx="0">
+            <a:schemeClr val="accent1"/>
+          </a:effectRef>
+          <a:fontRef idx="minor">
+            <a:schemeClr val="lt1"/>
+          </a:fontRef>
+        </p:style>
+        <p:txBody>
+          <a:bodyPr rtlCol="0" anchor="ctr"/>
+          <a:lstStyle/>
+          <a:p>
+            <a:pPr algn="ctr"/>
+            <a:endParaRPr lang="en-US"/>
+          </a:p>
+        </p:txBody>
+      </p:sp>
+      <p:sp>
+        <p:nvSpPr>
+          <p:cNvPr id="22" name="Up-Down Arrow 21">
+            <a:extLst>
+              <a:ext uri="{FF2B5EF4-FFF2-40B4-BE49-F238E27FC236}">
+                <a16:creationId xmlns:a16="http://schemas.microsoft.com/office/drawing/2014/main" id="{B3542883-1278-D748-8A83-17321AFA7323}"/>
+              </a:ext>
+            </a:extLst>
+          </p:cNvPr>
+          <p:cNvSpPr/>
+          <p:nvPr/>
+        </p:nvSpPr>
+        <p:spPr>
+          <a:xfrm>
+            <a:off x="6225067" y="2411608"/>
+            <a:ext cx="185738" cy="728664"/>
+          </a:xfrm>
+          <a:prstGeom prst="upDownArrow">
+            <a:avLst/>
+          </a:prstGeom>
+        </p:spPr>
+        <p:style>
+          <a:lnRef idx="2">
+            <a:schemeClr val="accent1">
+              <a:shade val="50000"/>
+            </a:schemeClr>
+          </a:lnRef>
+          <a:fillRef idx="1">
+            <a:schemeClr val="accent1"/>
+          </a:fillRef>
+          <a:effectRef idx="0">
+            <a:schemeClr val="accent1"/>
+          </a:effectRef>
+          <a:fontRef idx="minor">
+            <a:schemeClr val="lt1"/>
+          </a:fontRef>
+        </p:style>
+        <p:txBody>
+          <a:bodyPr rtlCol="0" anchor="ctr"/>
+          <a:lstStyle/>
+          <a:p>
+            <a:pPr algn="ctr"/>
+            <a:endParaRPr lang="en-US"/>
+          </a:p>
+        </p:txBody>
+      </p:sp>
+      <p:sp>
+        <p:nvSpPr>
+          <p:cNvPr id="23" name="Up-Down Arrow 22">
+            <a:extLst>
+              <a:ext uri="{FF2B5EF4-FFF2-40B4-BE49-F238E27FC236}">
+                <a16:creationId xmlns:a16="http://schemas.microsoft.com/office/drawing/2014/main" id="{4D5AF2F6-B1DD-7946-A816-9089955B5583}"/>
+              </a:ext>
+            </a:extLst>
+          </p:cNvPr>
+          <p:cNvSpPr/>
+          <p:nvPr/>
+        </p:nvSpPr>
+        <p:spPr>
+          <a:xfrm>
+            <a:off x="7820989" y="2411608"/>
+            <a:ext cx="185738" cy="728664"/>
+          </a:xfrm>
+          <a:prstGeom prst="upDownArrow">
+            <a:avLst/>
+          </a:prstGeom>
+        </p:spPr>
+        <p:style>
+          <a:lnRef idx="2">
+            <a:schemeClr val="accent1">
+              <a:shade val="50000"/>
+            </a:schemeClr>
+          </a:lnRef>
+          <a:fillRef idx="1">
+            <a:schemeClr val="accent1"/>
+          </a:fillRef>
+          <a:effectRef idx="0">
+            <a:schemeClr val="accent1"/>
+          </a:effectRef>
+          <a:fontRef idx="minor">
+            <a:schemeClr val="lt1"/>
+          </a:fontRef>
+        </p:style>
+        <p:txBody>
+          <a:bodyPr rtlCol="0" anchor="ctr"/>
+          <a:lstStyle/>
+          <a:p>
+            <a:pPr algn="ctr"/>
             <a:endParaRPr lang="en-US"/>
           </a:p>
         </p:txBody>

</xml_diff>